<commit_message>
Some more random files added
</commit_message>
<xml_diff>
--- a/git_it.pptx
+++ b/git_it.pptx
@@ -521,20 +521,18 @@
           <a:bodyPr/>
           <a:lstStyle/>
           <a:p>
+            <a:r>
+              <a:rPr lang="en-US" dirty="0"/>
+              <a:t>Q. Why is a version control important?</a:t>
+            </a:r>
+          </a:p>
+          <a:p>
             <a:pPr marL="228600" indent="-228600">
               <a:buAutoNum type="arabicPeriod"/>
             </a:pPr>
             <a:r>
               <a:rPr lang="en-US" dirty="0"/>
-              <a:t>Everything in Git is </a:t>
-            </a:r>
-            <a:r>
-              <a:rPr lang="en-US" dirty="0" err="1"/>
-              <a:t>checksummed</a:t>
-            </a:r>
-            <a:r>
-              <a:rPr lang="en-US" dirty="0"/>
-              <a:t> before it is stored and is then referred to by that checksum. Git stores everything in its database not by filename but by the hash value of its contents.</a:t>
+              <a:t>Look at old snapshots of a project</a:t>
             </a:r>
           </a:p>
           <a:p>
@@ -543,60 +541,16 @@
             </a:pPr>
             <a:r>
               <a:rPr lang="en-US" dirty="0"/>
-              <a:t>It’s difficult to do dangerous things in Git</a:t>
+              <a:t>Log of why certain changes were made</a:t>
             </a:r>
           </a:p>
           <a:p>
             <a:pPr marL="228600" indent="-228600">
               <a:buAutoNum type="arabicPeriod"/>
             </a:pPr>
-            <a:endParaRPr lang="en-US" b="1" dirty="0"/>
-          </a:p>
-          <a:p>
-            <a:pPr marL="0" indent="0">
-              <a:buNone/>
-            </a:pPr>
-            <a:r>
-              <a:rPr lang="en-US" b="1" dirty="0"/>
-              <a:t>Basic Git workflow</a:t>
-            </a:r>
-          </a:p>
-          <a:p>
-            <a:pPr marL="171450" indent="-171450">
-              <a:buFont typeface="Arial" panose="020B0604020202020204" pitchFamily="34" charset="0"/>
-              <a:buChar char="•"/>
-            </a:pPr>
             <a:r>
               <a:rPr lang="en-US" dirty="0"/>
-              <a:t>You </a:t>
-            </a:r>
-            <a:r>
-              <a:rPr lang="en-US" b="1" dirty="0"/>
-              <a:t>modify </a:t>
-            </a:r>
-            <a:r>
-              <a:rPr lang="en-US" dirty="0"/>
-              <a:t>your files in your working tree.</a:t>
-            </a:r>
-          </a:p>
-          <a:p>
-            <a:pPr marL="171450" indent="-171450">
-              <a:buFont typeface="Arial" panose="020B0604020202020204" pitchFamily="34" charset="0"/>
-              <a:buChar char="•"/>
-            </a:pPr>
-            <a:r>
-              <a:rPr lang="en-US" dirty="0"/>
-              <a:t>You selectively stage just those changes you want to be part of your next commit, which adds only those changes to the staging area.</a:t>
-            </a:r>
-          </a:p>
-          <a:p>
-            <a:pPr marL="171450" indent="-171450">
-              <a:buFont typeface="Arial" panose="020B0604020202020204" pitchFamily="34" charset="0"/>
-              <a:buChar char="•"/>
-            </a:pPr>
-            <a:r>
-              <a:rPr lang="en-US" dirty="0"/>
-              <a:t>You do a commit, which takes the files as they are in the staging area and stores that snapshot permanently to your Git directory.</a:t>
+              <a:t>Work on parallel branches </a:t>
             </a:r>
           </a:p>
           <a:p>
@@ -606,6 +560,20 @@
             <a:endParaRPr lang="en-US" dirty="0"/>
           </a:p>
           <a:p>
+            <a:pPr marL="0" indent="0">
+              <a:buNone/>
+            </a:pPr>
+            <a:r>
+              <a:rPr lang="en-US" dirty="0"/>
+              <a:t>For us </a:t>
+            </a:r>
+            <a:r>
+              <a:rPr lang="en-US" b="1" dirty="0"/>
+              <a:t>COLLABORATION.</a:t>
+            </a:r>
+            <a:endParaRPr lang="en-US" dirty="0"/>
+          </a:p>
+          <a:p>
             <a:pPr marL="228600" indent="-228600">
               <a:buAutoNum type="arabicPeriod"/>
             </a:pPr>
@@ -630,7 +598,7 @@
           <a:p>
             <a:fld id="{3CDF790D-088E-1648-8BA9-6F2C76E3FAE2}" type="slidenum">
               <a:rPr lang="en-US" smtClean="0"/>
-              <a:t>6</a:t>
+              <a:t>2</a:t>
             </a:fld>
             <a:endParaRPr lang="en-US"/>
           </a:p>
@@ -639,7 +607,7 @@
     </p:spTree>
     <p:extLst>
       <p:ext uri="{BB962C8B-B14F-4D97-AF65-F5344CB8AC3E}">
-        <p14:creationId xmlns:p14="http://schemas.microsoft.com/office/powerpoint/2010/main" val="194654126"/>
+        <p14:creationId xmlns:p14="http://schemas.microsoft.com/office/powerpoint/2010/main" val="4054050987"/>
       </p:ext>
     </p:extLst>
   </p:cSld>
@@ -698,7 +666,15 @@
             </a:pPr>
             <a:r>
               <a:rPr lang="en-US" dirty="0"/>
-              <a:t>Modified means you have changed the file but have not committed it to your database yet.</a:t>
+              <a:t>Everything in Git is </a:t>
+            </a:r>
+            <a:r>
+              <a:rPr lang="en-US" dirty="0" err="1"/>
+              <a:t>checksummed</a:t>
+            </a:r>
+            <a:r>
+              <a:rPr lang="en-US" dirty="0"/>
+              <a:t> before it is stored and is then referred to by that checksum. Git stores everything in its database not by filename but by the hash value of its contents.</a:t>
             </a:r>
           </a:p>
           <a:p>
@@ -707,17 +683,73 @@
             </a:pPr>
             <a:r>
               <a:rPr lang="en-US" dirty="0"/>
-              <a:t>Staged means that you have marked a modified file in its current version to go into your next commit snapshot.</a:t>
+              <a:t>It’s difficult to do dangerous things in Git</a:t>
             </a:r>
           </a:p>
           <a:p>
             <a:pPr marL="228600" indent="-228600">
               <a:buAutoNum type="arabicPeriod"/>
             </a:pPr>
+            <a:endParaRPr lang="en-US" b="1" dirty="0"/>
+          </a:p>
+          <a:p>
+            <a:pPr marL="0" indent="0">
+              <a:buNone/>
+            </a:pPr>
+            <a:r>
+              <a:rPr lang="en-US" b="1" dirty="0"/>
+              <a:t>Basic Git workflow</a:t>
+            </a:r>
+          </a:p>
+          <a:p>
+            <a:pPr marL="171450" indent="-171450">
+              <a:buFont typeface="Arial" panose="020B0604020202020204" pitchFamily="34" charset="0"/>
+              <a:buChar char="•"/>
+            </a:pPr>
             <a:r>
               <a:rPr lang="en-US" dirty="0"/>
-              <a:t>Committed means that the data is safely stored in your local database.</a:t>
-            </a:r>
+              <a:t>You </a:t>
+            </a:r>
+            <a:r>
+              <a:rPr lang="en-US" b="1" dirty="0"/>
+              <a:t>modify </a:t>
+            </a:r>
+            <a:r>
+              <a:rPr lang="en-US" dirty="0"/>
+              <a:t>your files in your working tree.</a:t>
+            </a:r>
+          </a:p>
+          <a:p>
+            <a:pPr marL="171450" indent="-171450">
+              <a:buFont typeface="Arial" panose="020B0604020202020204" pitchFamily="34" charset="0"/>
+              <a:buChar char="•"/>
+            </a:pPr>
+            <a:r>
+              <a:rPr lang="en-US" dirty="0"/>
+              <a:t>You selectively stage just those changes you want to be part of your next commit, which adds only those changes to the staging area.</a:t>
+            </a:r>
+          </a:p>
+          <a:p>
+            <a:pPr marL="171450" indent="-171450">
+              <a:buFont typeface="Arial" panose="020B0604020202020204" pitchFamily="34" charset="0"/>
+              <a:buChar char="•"/>
+            </a:pPr>
+            <a:r>
+              <a:rPr lang="en-US" dirty="0"/>
+              <a:t>You do a commit, which takes the files as they are in the staging area and stores that snapshot permanently to your Git directory.</a:t>
+            </a:r>
+          </a:p>
+          <a:p>
+            <a:pPr marL="228600" indent="-228600">
+              <a:buAutoNum type="arabicPeriod"/>
+            </a:pPr>
+            <a:endParaRPr lang="en-US" dirty="0"/>
+          </a:p>
+          <a:p>
+            <a:pPr marL="228600" indent="-228600">
+              <a:buAutoNum type="arabicPeriod"/>
+            </a:pPr>
+            <a:endParaRPr lang="en-US" dirty="0"/>
           </a:p>
         </p:txBody>
       </p:sp>
@@ -738,7 +770,7 @@
           <a:p>
             <a:fld id="{3CDF790D-088E-1648-8BA9-6F2C76E3FAE2}" type="slidenum">
               <a:rPr lang="en-US" smtClean="0"/>
-              <a:t>7</a:t>
+              <a:t>6</a:t>
             </a:fld>
             <a:endParaRPr lang="en-US"/>
           </a:p>
@@ -747,7 +779,7 @@
     </p:spTree>
     <p:extLst>
       <p:ext uri="{BB962C8B-B14F-4D97-AF65-F5344CB8AC3E}">
-        <p14:creationId xmlns:p14="http://schemas.microsoft.com/office/powerpoint/2010/main" val="360872458"/>
+        <p14:creationId xmlns:p14="http://schemas.microsoft.com/office/powerpoint/2010/main" val="194654126"/>
       </p:ext>
     </p:extLst>
   </p:cSld>
@@ -806,6 +838,173 @@
             </a:pPr>
             <a:r>
               <a:rPr lang="en-US" dirty="0"/>
+              <a:t>Modified means you have changed the file but have not committed it to your database yet.</a:t>
+            </a:r>
+          </a:p>
+          <a:p>
+            <a:pPr marL="228600" indent="-228600">
+              <a:buAutoNum type="arabicPeriod"/>
+            </a:pPr>
+            <a:r>
+              <a:rPr lang="en-US" dirty="0"/>
+              <a:t>Staged means that you have marked a modified file in its current version to go into your next commit snapshot.</a:t>
+            </a:r>
+          </a:p>
+          <a:p>
+            <a:pPr marL="228600" indent="-228600">
+              <a:buAutoNum type="arabicPeriod"/>
+            </a:pPr>
+            <a:r>
+              <a:rPr lang="en-US" dirty="0"/>
+              <a:t>Committed means that the data is safely stored in your local database.</a:t>
+            </a:r>
+          </a:p>
+          <a:p>
+            <a:pPr marL="228600" indent="-228600">
+              <a:buAutoNum type="arabicPeriod"/>
+            </a:pPr>
+            <a:endParaRPr lang="en-US" dirty="0"/>
+          </a:p>
+          <a:p>
+            <a:pPr marL="0" indent="0">
+              <a:buNone/>
+            </a:pPr>
+            <a:r>
+              <a:rPr lang="en-US" b="1" dirty="0"/>
+              <a:t>Basic Git workflow</a:t>
+            </a:r>
+          </a:p>
+          <a:p>
+            <a:pPr marL="171450" indent="-171450">
+              <a:buFont typeface="Arial" panose="020B0604020202020204" pitchFamily="34" charset="0"/>
+              <a:buChar char="•"/>
+            </a:pPr>
+            <a:r>
+              <a:rPr lang="en-US" dirty="0"/>
+              <a:t>You </a:t>
+            </a:r>
+            <a:r>
+              <a:rPr lang="en-US" b="1" dirty="0"/>
+              <a:t>modify </a:t>
+            </a:r>
+            <a:r>
+              <a:rPr lang="en-US" dirty="0"/>
+              <a:t>your files in your working tree.</a:t>
+            </a:r>
+          </a:p>
+          <a:p>
+            <a:pPr marL="171450" indent="-171450">
+              <a:buFont typeface="Arial" panose="020B0604020202020204" pitchFamily="34" charset="0"/>
+              <a:buChar char="•"/>
+            </a:pPr>
+            <a:r>
+              <a:rPr lang="en-US" dirty="0"/>
+              <a:t>You selectively stage just those changes you want to be part of your next commit, which adds only those changes to the staging area.</a:t>
+            </a:r>
+          </a:p>
+          <a:p>
+            <a:pPr marL="171450" indent="-171450">
+              <a:buFont typeface="Arial" panose="020B0604020202020204" pitchFamily="34" charset="0"/>
+              <a:buChar char="•"/>
+            </a:pPr>
+            <a:r>
+              <a:rPr lang="en-US" dirty="0"/>
+              <a:t>You do a commit, which takes the files as they are in the staging area and stores that snapshot permanently to your Git directory.</a:t>
+            </a:r>
+          </a:p>
+          <a:p>
+            <a:pPr marL="228600" indent="-228600">
+              <a:buAutoNum type="arabicPeriod"/>
+            </a:pPr>
+            <a:endParaRPr lang="en-US" dirty="0"/>
+          </a:p>
+        </p:txBody>
+      </p:sp>
+      <p:sp>
+        <p:nvSpPr>
+          <p:cNvPr id="4" name="Slide Number Placeholder 3"/>
+          <p:cNvSpPr>
+            <a:spLocks noGrp="1"/>
+          </p:cNvSpPr>
+          <p:nvPr>
+            <p:ph type="sldNum" sz="quarter" idx="5"/>
+          </p:nvPr>
+        </p:nvSpPr>
+        <p:spPr/>
+        <p:txBody>
+          <a:bodyPr/>
+          <a:lstStyle/>
+          <a:p>
+            <a:fld id="{3CDF790D-088E-1648-8BA9-6F2C76E3FAE2}" type="slidenum">
+              <a:rPr lang="en-US" smtClean="0"/>
+              <a:t>7</a:t>
+            </a:fld>
+            <a:endParaRPr lang="en-US"/>
+          </a:p>
+        </p:txBody>
+      </p:sp>
+    </p:spTree>
+    <p:extLst>
+      <p:ext uri="{BB962C8B-B14F-4D97-AF65-F5344CB8AC3E}">
+        <p14:creationId xmlns:p14="http://schemas.microsoft.com/office/powerpoint/2010/main" val="360872458"/>
+      </p:ext>
+    </p:extLst>
+  </p:cSld>
+  <p:clrMapOvr>
+    <a:masterClrMapping/>
+  </p:clrMapOvr>
+</p:notes>
+</file>
+
+<file path=ppt/notesSlides/notesSlide4.xml><?xml version="1.0" encoding="utf-8"?>
+<p:notes xmlns:a="http://schemas.openxmlformats.org/drawingml/2006/main" xmlns:r="http://schemas.openxmlformats.org/officeDocument/2006/relationships" xmlns:p="http://schemas.openxmlformats.org/presentationml/2006/main">
+  <p:cSld>
+    <p:spTree>
+      <p:nvGrpSpPr>
+        <p:cNvPr id="1" name=""/>
+        <p:cNvGrpSpPr/>
+        <p:nvPr/>
+      </p:nvGrpSpPr>
+      <p:grpSpPr>
+        <a:xfrm>
+          <a:off x="0" y="0"/>
+          <a:ext cx="0" cy="0"/>
+          <a:chOff x="0" y="0"/>
+          <a:chExt cx="0" cy="0"/>
+        </a:xfrm>
+      </p:grpSpPr>
+      <p:sp>
+        <p:nvSpPr>
+          <p:cNvPr id="2" name="Slide Image Placeholder 1"/>
+          <p:cNvSpPr>
+            <a:spLocks noGrp="1" noRot="1" noChangeAspect="1"/>
+          </p:cNvSpPr>
+          <p:nvPr>
+            <p:ph type="sldImg"/>
+          </p:nvPr>
+        </p:nvSpPr>
+        <p:spPr/>
+      </p:sp>
+      <p:sp>
+        <p:nvSpPr>
+          <p:cNvPr id="3" name="Notes Placeholder 2"/>
+          <p:cNvSpPr>
+            <a:spLocks noGrp="1"/>
+          </p:cNvSpPr>
+          <p:nvPr>
+            <p:ph type="body" idx="1"/>
+          </p:nvPr>
+        </p:nvSpPr>
+        <p:spPr/>
+        <p:txBody>
+          <a:bodyPr/>
+          <a:lstStyle/>
+          <a:p>
+            <a:pPr marL="228600" indent="-228600">
+              <a:buAutoNum type="arabicPeriod"/>
+            </a:pPr>
+            <a:r>
+              <a:rPr lang="en-US" dirty="0"/>
               <a:t>Everything in Git is </a:t>
             </a:r>
             <a:r>
@@ -870,7 +1069,7 @@
 </p:notes>
 </file>
 
-<file path=ppt/notesSlides/notesSlide4.xml><?xml version="1.0" encoding="utf-8"?>
+<file path=ppt/notesSlides/notesSlide5.xml><?xml version="1.0" encoding="utf-8"?>
 <p:notes xmlns:a="http://schemas.openxmlformats.org/drawingml/2006/main" xmlns:r="http://schemas.openxmlformats.org/officeDocument/2006/relationships" xmlns:p="http://schemas.openxmlformats.org/presentationml/2006/main">
   <p:cSld>
     <p:spTree>
@@ -4304,8 +4503,38 @@
         </p:blipFill>
         <p:spPr>
           <a:xfrm>
-            <a:off x="1967291" y="1470661"/>
-            <a:ext cx="7245350" cy="3022669"/>
+            <a:off x="6473976" y="2449830"/>
+            <a:ext cx="4694147" cy="1958339"/>
+          </a:xfrm>
+          <a:prstGeom prst="rect">
+            <a:avLst/>
+          </a:prstGeom>
+        </p:spPr>
+      </p:pic>
+      <p:pic>
+        <p:nvPicPr>
+          <p:cNvPr id="3" name="Picture 2">
+            <a:extLst>
+              <a:ext uri="{FF2B5EF4-FFF2-40B4-BE49-F238E27FC236}">
+                <a16:creationId xmlns:a16="http://schemas.microsoft.com/office/drawing/2014/main" id="{8CE02733-93D2-0441-A488-BC100322A75D}"/>
+              </a:ext>
+            </a:extLst>
+          </p:cNvPr>
+          <p:cNvPicPr>
+            <a:picLocks noChangeAspect="1"/>
+          </p:cNvPicPr>
+          <p:nvPr/>
+        </p:nvPicPr>
+        <p:blipFill>
+          <a:blip r:embed="rId5"/>
+          <a:stretch>
+            <a:fillRect/>
+          </a:stretch>
+        </p:blipFill>
+        <p:spPr>
+          <a:xfrm>
+            <a:off x="1416049" y="979152"/>
+            <a:ext cx="3148693" cy="4560834"/>
           </a:xfrm>
           <a:prstGeom prst="rect">
             <a:avLst/>
@@ -4857,7 +5086,7 @@
           <p:nvPr/>
         </p:nvPicPr>
         <p:blipFill>
-          <a:blip r:embed="rId2"/>
+          <a:blip r:embed="rId3"/>
           <a:stretch>
             <a:fillRect/>
           </a:stretch>
@@ -4955,7 +5184,7 @@
           <p:nvPr/>
         </p:nvPicPr>
         <p:blipFill>
-          <a:blip r:embed="rId3"/>
+          <a:blip r:embed="rId4"/>
           <a:stretch>
             <a:fillRect/>
           </a:stretch>
@@ -7133,9 +7362,10 @@
           <a:lstStyle/>
           <a:p>
             <a:r>
-              <a:rPr lang="en-US" dirty="0"/>
-              <a:t>Basic git workflow</a:t>
-            </a:r>
+              <a:rPr lang="en-US"/>
+              <a:t>Git’s data model</a:t>
+            </a:r>
+            <a:endParaRPr lang="en-US" dirty="0"/>
           </a:p>
         </p:txBody>
       </p:sp>
@@ -7160,30 +7390,7 @@
           <a:bodyPr/>
           <a:lstStyle/>
           <a:p>
-            <a:r>
-              <a:rPr lang="en-US" dirty="0"/>
-              <a:t>You </a:t>
-            </a:r>
-            <a:r>
-              <a:rPr lang="en-US" b="1" dirty="0"/>
-              <a:t>modify </a:t>
-            </a:r>
-            <a:r>
-              <a:rPr lang="en-US" dirty="0"/>
-              <a:t>your files in your working tree.</a:t>
-            </a:r>
-          </a:p>
-          <a:p>
-            <a:r>
-              <a:rPr lang="en-US" dirty="0"/>
-              <a:t>You selectively stage just those changes you want to be part of your next commit, which adds only those changes to the staging area.</a:t>
-            </a:r>
-          </a:p>
-          <a:p>
-            <a:r>
-              <a:rPr lang="en-US" dirty="0"/>
-              <a:t>You do a commit, which takes the files as they are in the staging area and stores that snapshot permanently to your Git directory.</a:t>
-            </a:r>
+            <a:endParaRPr lang="en-US" dirty="0"/>
           </a:p>
         </p:txBody>
       </p:sp>

</xml_diff>